<commit_message>
Improving previous slides, some advices about the future and small litle things
</commit_message>
<xml_diff>
--- a/liferay-modularity-devcon2013/LiferayModularity-2013DEVCON.pptx
+++ b/liferay-modularity-devcon2013/LiferayModularity-2013DEVCON.pptx
@@ -20,13 +20,14 @@
     <p:sldId id="263" r:id="rId13"/>
     <p:sldId id="264" r:id="rId14"/>
     <p:sldId id="265" r:id="rId15"/>
+    <p:sldId id="266" r:id="rId16"/>
   </p:sldIdLst>
   <p:sldSz cx="9144000" cy="6858000"/>
   <p:notesSz cx="7559675" cy="10691812"/>
 </p:presentation>
 </file>
 
-<file path=ppt/charts/chart24.xml><?xml version="1.0" encoding="utf-8"?>
+<file path=ppt/charts/chart3.xml><?xml version="1.0" encoding="utf-8"?>
 <c:chartSpace xmlns:a="http://schemas.openxmlformats.org/drawingml/2006/main" xmlns:c="http://schemas.openxmlformats.org/drawingml/2006/chart" xmlns:r="http://schemas.openxmlformats.org/officeDocument/2006/relationships">
   <c:lang val="en-US"/>
   <c:chart>
@@ -170,11 +171,11 @@
           </c:val>
         </c:ser>
         <c:marker val="0"/>
-        <c:axId val="4969761"/>
-        <c:axId val="41840088"/>
+        <c:axId val="59704990"/>
+        <c:axId val="1627754"/>
       </c:lineChart>
       <c:catAx>
-        <c:axId val="4969761"/>
+        <c:axId val="59704990"/>
         <c:scaling>
           <c:orientation val="minMax"/>
         </c:scaling>
@@ -182,7 +183,7 @@
         <c:majorTickMark val="out"/>
         <c:minorTickMark val="none"/>
         <c:tickLblPos val="nextTo"/>
-        <c:crossAx val="41840088"/>
+        <c:crossAx val="1627754"/>
         <c:crossesAt val="0"/>
         <c:lblAlgn val="ctr"/>
         <c:auto val="1"/>
@@ -197,7 +198,7 @@
         </c:spPr>
       </c:catAx>
       <c:valAx>
-        <c:axId val="41840088"/>
+        <c:axId val="1627754"/>
         <c:scaling>
           <c:orientation val="minMax"/>
         </c:scaling>
@@ -215,7 +216,7 @@
         <c:majorTickMark val="out"/>
         <c:minorTickMark val="none"/>
         <c:tickLblPos val="none"/>
-        <c:crossAx val="4969761"/>
+        <c:crossAx val="59704990"/>
         <c:crossesAt val="1"/>
         <c:spPr>
           <a:ln w="9360">
@@ -403,7 +404,7 @@
           <a:bodyPr anchor="b" bIns="0" lIns="0" rIns="0" tIns="0" wrap="none"/>
           <a:p>
             <a:pPr algn="r"/>
-            <a:fld id="{F3879425-E44B-4898-A71F-F38352B8E391}" type="slidenum">
+            <a:fld id="{7FBE9272-9B92-437A-A9FB-0075C11C4A1E}" type="slidenum">
               <a:rPr lang="en-GB"/>
               <a:t>&lt;number&gt;</a:t>
             </a:fld>
@@ -415,6 +416,78 @@
   </p:cSld>
   <p:clrMap accent1="accent1" accent2="accent2" accent3="accent3" accent4="accent4" accent5="accent5" accent6="accent6" bg1="lt1" bg2="lt2" folHlink="folHlink" hlink="hlink" tx1="dk1" tx2="dk2"/>
 </p:notesMaster>
+</file>
+
+<file path=ppt/notesSlides/notesSlide10.xml><?xml version="1.0" encoding="utf-8"?>
+<p:notes xmlns:a="http://schemas.openxmlformats.org/drawingml/2006/main" xmlns:p="http://schemas.openxmlformats.org/presentationml/2006/main" xmlns:r="http://schemas.openxmlformats.org/officeDocument/2006/relationships">
+  <p:cSld>
+    <p:spTree>
+      <p:nvGrpSpPr>
+        <p:cNvPr id="1" name=""/>
+        <p:cNvGrpSpPr/>
+        <p:nvPr/>
+      </p:nvGrpSpPr>
+      <p:grpSpPr>
+        <a:xfrm>
+          <a:off x="0" y="0"/>
+          <a:ext cx="0" cy="0"/>
+          <a:chOff x="0" y="0"/>
+          <a:chExt cx="0" cy="0"/>
+        </a:xfrm>
+      </p:grpSpPr>
+      <p:sp>
+        <p:nvSpPr>
+          <p:cNvPr id="128" name="PlaceHolder 1"/>
+          <p:cNvSpPr>
+            <a:spLocks noGrp="1"/>
+          </p:cNvSpPr>
+          <p:nvPr>
+            <p:ph type="body"/>
+          </p:nvPr>
+        </p:nvSpPr>
+        <p:spPr>
+          <a:xfrm>
+            <a:off x="648720" y="360000"/>
+            <a:ext cx="6046920" cy="9791640"/>
+          </a:xfrm>
+          <a:prstGeom prst="rect">
+            <a:avLst/>
+          </a:prstGeom>
+        </p:spPr>
+        <p:txBody>
+          <a:bodyPr bIns="0" lIns="0" rIns="0" tIns="0" wrap="none"/>
+          <a:p>
+            <a:r>
+              <a:rPr lang="en-GB"/>
+              <a:t>Hands-on on how to write some example applications:</a:t>
+            </a:r>
+            <a:endParaRPr/>
+          </a:p>
+          <a:p>
+            <a:endParaRPr/>
+          </a:p>
+          <a:p>
+            <a:r>
+              <a:rPr lang="en-GB"/>
+              <a:t>We can use some of the apps we have already builtin since, IMHO, they can be used for teaching purposes.</a:t>
+            </a:r>
+            <a:endParaRPr/>
+          </a:p>
+          <a:p>
+            <a:endParaRPr/>
+          </a:p>
+          <a:p>
+            <a:r>
+              <a:rPr lang="en-GB"/>
+              <a:t>This will help us not only to show how write the apps but to show the current abilities of the Plugins SDK related with all this new stuff</a:t>
+            </a:r>
+            <a:endParaRPr/>
+          </a:p>
+        </p:txBody>
+      </p:sp>
+    </p:spTree>
+  </p:cSld>
+</p:notes>
 </file>
 
 <file path=ppt/notesSlides/notesSlide2.xml><?xml version="1.0" encoding="utf-8"?>
@@ -436,7 +509,7 @@
       </p:grpSpPr>
       <p:sp>
         <p:nvSpPr>
-          <p:cNvPr id="165" name="PlaceHolder 1"/>
+          <p:cNvPr id="120" name="PlaceHolder 1"/>
           <p:cNvSpPr>
             <a:spLocks noGrp="1"/>
           </p:cNvSpPr>
@@ -447,7 +520,7 @@
         <p:spPr>
           <a:xfrm>
             <a:off x="756000" y="5078520"/>
-            <a:ext cx="6047280" cy="4811040"/>
+            <a:ext cx="6046920" cy="4810680"/>
           </a:xfrm>
           <a:prstGeom prst="rect">
             <a:avLst/>
@@ -737,7 +810,7 @@
       </p:grpSpPr>
       <p:sp>
         <p:nvSpPr>
-          <p:cNvPr id="166" name="PlaceHolder 1"/>
+          <p:cNvPr id="121" name="PlaceHolder 1"/>
           <p:cNvSpPr>
             <a:spLocks noGrp="1"/>
           </p:cNvSpPr>
@@ -748,7 +821,7 @@
         <p:spPr>
           <a:xfrm>
             <a:off x="756000" y="5078520"/>
-            <a:ext cx="6047280" cy="4810680"/>
+            <a:ext cx="6046920" cy="4810320"/>
           </a:xfrm>
           <a:prstGeom prst="rect">
             <a:avLst/>
@@ -789,7 +862,7 @@
       </p:grpSpPr>
       <p:sp>
         <p:nvSpPr>
-          <p:cNvPr id="167" name="PlaceHolder 1"/>
+          <p:cNvPr id="122" name="PlaceHolder 1"/>
           <p:cNvSpPr>
             <a:spLocks noGrp="1"/>
           </p:cNvSpPr>
@@ -800,7 +873,7 @@
         <p:spPr>
           <a:xfrm>
             <a:off x="756000" y="5078520"/>
-            <a:ext cx="6047280" cy="4811040"/>
+            <a:ext cx="6046920" cy="4810680"/>
           </a:xfrm>
           <a:prstGeom prst="rect">
             <a:avLst/>
@@ -1220,7 +1293,7 @@
       </p:grpSpPr>
       <p:sp>
         <p:nvSpPr>
-          <p:cNvPr id="168" name="PlaceHolder 1"/>
+          <p:cNvPr id="123" name="PlaceHolder 1"/>
           <p:cNvSpPr>
             <a:spLocks noGrp="1"/>
           </p:cNvSpPr>
@@ -1231,7 +1304,7 @@
         <p:spPr>
           <a:xfrm>
             <a:off x="756000" y="5078520"/>
-            <a:ext cx="6047280" cy="4810680"/>
+            <a:ext cx="6046920" cy="4810320"/>
           </a:xfrm>
           <a:prstGeom prst="rect">
             <a:avLst/>
@@ -1437,7 +1510,7 @@
       </p:grpSpPr>
       <p:sp>
         <p:nvSpPr>
-          <p:cNvPr id="169" name="PlaceHolder 1"/>
+          <p:cNvPr id="124" name="PlaceHolder 1"/>
           <p:cNvSpPr>
             <a:spLocks noGrp="1"/>
           </p:cNvSpPr>
@@ -1448,7 +1521,7 @@
         <p:spPr>
           <a:xfrm>
             <a:off x="756000" y="5078520"/>
-            <a:ext cx="6047280" cy="4810680"/>
+            <a:ext cx="6046920" cy="4810320"/>
           </a:xfrm>
           <a:prstGeom prst="rect">
             <a:avLst/>
@@ -1614,7 +1687,7 @@
       </p:grpSpPr>
       <p:sp>
         <p:nvSpPr>
-          <p:cNvPr id="170" name="PlaceHolder 1"/>
+          <p:cNvPr id="125" name="PlaceHolder 1"/>
           <p:cNvSpPr>
             <a:spLocks noGrp="1"/>
           </p:cNvSpPr>
@@ -1625,7 +1698,7 @@
         <p:spPr>
           <a:xfrm>
             <a:off x="756000" y="5078520"/>
-            <a:ext cx="6047280" cy="4810680"/>
+            <a:ext cx="6046920" cy="4810320"/>
           </a:xfrm>
           <a:prstGeom prst="rect">
             <a:avLst/>
@@ -1666,7 +1739,7 @@
       </p:grpSpPr>
       <p:sp>
         <p:nvSpPr>
-          <p:cNvPr id="171" name="PlaceHolder 1"/>
+          <p:cNvPr id="126" name="PlaceHolder 1"/>
           <p:cNvSpPr>
             <a:spLocks noGrp="1"/>
           </p:cNvSpPr>
@@ -1677,7 +1750,7 @@
         <p:spPr>
           <a:xfrm>
             <a:off x="648720" y="360000"/>
-            <a:ext cx="6047280" cy="9792000"/>
+            <a:ext cx="6046920" cy="9791640"/>
           </a:xfrm>
           <a:prstGeom prst="rect">
             <a:avLst/>
@@ -1697,45 +1770,65 @@
           </a:p>
           <a:p>
             <a:r>
-              <a:rPr lang="en-US"/>
-              <a:t>Embedded OSGI framework Ideally should be </a:t>
-            </a:r>
-            <a:r>
-              <a:rPr lang="en-US"/>
-              <a:t>“agnostic”: Felix and Equinox are supported</a:t>
-            </a:r>
-            <a:endParaRPr/>
-          </a:p>
-          <a:p>
-            <a:pPr lvl="2"/>
-            <a:endParaRPr/>
-          </a:p>
-          <a:p>
-            <a:pPr lvl="1"/>
-            <a:r>
-              <a:rPr lang="en-US"/>
+              <a:rPr lang="en-GB"/>
+              <a:t>Embedded OSGI framework Ideally should be “agnostic”: Felix and Equinox are supported</a:t>
+            </a:r>
+            <a:endParaRPr/>
+          </a:p>
+          <a:p>
+            <a:pPr>
+              <a:lnSpc>
+                <a:spcPct val="100000"/>
+              </a:lnSpc>
+            </a:pPr>
+            <a:endParaRPr/>
+          </a:p>
+          <a:p>
+            <a:pPr>
+              <a:lnSpc>
+                <a:spcPct val="100000"/>
+              </a:lnSpc>
+            </a:pPr>
+            <a:r>
+              <a:rPr lang="en-GB"/>
               <a:t>HTTP Service implementation</a:t>
             </a:r>
             <a:endParaRPr/>
           </a:p>
           <a:p>
-            <a:pPr lvl="1"/>
-            <a:endParaRPr/>
-          </a:p>
-          <a:p>
-            <a:pPr lvl="1"/>
-            <a:r>
-              <a:rPr lang="en-US"/>
+            <a:pPr>
+              <a:lnSpc>
+                <a:spcPct val="100000"/>
+              </a:lnSpc>
+            </a:pPr>
+            <a:endParaRPr/>
+          </a:p>
+          <a:p>
+            <a:pPr>
+              <a:lnSpc>
+                <a:spcPct val="100000"/>
+              </a:lnSpc>
+            </a:pPr>
+            <a:r>
+              <a:rPr lang="en-GB"/>
               <a:t>Backwards compatible</a:t>
             </a:r>
             <a:endParaRPr/>
           </a:p>
           <a:p>
-            <a:pPr lvl="1"/>
-            <a:endParaRPr/>
-          </a:p>
-          <a:p>
-            <a:pPr lvl="1"/>
+            <a:pPr>
+              <a:lnSpc>
+                <a:spcPct val="100000"/>
+              </a:lnSpc>
+            </a:pPr>
+            <a:endParaRPr/>
+          </a:p>
+          <a:p>
+            <a:pPr>
+              <a:lnSpc>
+                <a:spcPct val="100000"/>
+              </a:lnSpc>
+            </a:pPr>
             <a:r>
               <a:rPr lang="en-GB"/>
               <a:t>Always enabled</a:t>
@@ -1743,11 +1836,19 @@
             <a:endParaRPr/>
           </a:p>
           <a:p>
-            <a:pPr lvl="1"/>
-            <a:endParaRPr/>
-          </a:p>
-          <a:p>
-            <a:pPr lvl="1"/>
+            <a:pPr>
+              <a:lnSpc>
+                <a:spcPct val="100000"/>
+              </a:lnSpc>
+            </a:pPr>
+            <a:endParaRPr/>
+          </a:p>
+          <a:p>
+            <a:pPr>
+              <a:lnSpc>
+                <a:spcPct val="100000"/>
+              </a:lnSpc>
+            </a:pPr>
             <a:r>
               <a:rPr lang="en-GB"/>
               <a:t>The idea of this slide is to present the overall of the architecture built-in inside Liferay but without going too much deep in the stack (I tend to think most of the people gets bored when you go too deeper)</a:t>
@@ -1755,13 +1856,27 @@
             <a:endParaRPr/>
           </a:p>
           <a:p>
-            <a:pPr lvl="1"/>
-            <a:endParaRPr/>
-          </a:p>
-          <a:p>
-            <a:endParaRPr/>
-          </a:p>
-          <a:p>
+            <a:pPr>
+              <a:lnSpc>
+                <a:spcPct val="100000"/>
+              </a:lnSpc>
+            </a:pPr>
+            <a:endParaRPr/>
+          </a:p>
+          <a:p>
+            <a:pPr>
+              <a:lnSpc>
+                <a:spcPct val="100000"/>
+              </a:lnSpc>
+            </a:pPr>
+            <a:endParaRPr/>
+          </a:p>
+          <a:p>
+            <a:pPr>
+              <a:lnSpc>
+                <a:spcPct val="100000"/>
+              </a:lnSpc>
+            </a:pPr>
             <a:endParaRPr/>
           </a:p>
         </p:txBody>
@@ -1790,7 +1905,7 @@
       </p:grpSpPr>
       <p:sp>
         <p:nvSpPr>
-          <p:cNvPr id="172" name="PlaceHolder 1"/>
+          <p:cNvPr id="127" name="PlaceHolder 1"/>
           <p:cNvSpPr>
             <a:spLocks noGrp="1"/>
           </p:cNvSpPr>
@@ -1801,7 +1916,7 @@
         <p:spPr>
           <a:xfrm>
             <a:off x="648720" y="360000"/>
-            <a:ext cx="6047280" cy="9792000"/>
+            <a:ext cx="6046920" cy="9791640"/>
           </a:xfrm>
           <a:prstGeom prst="rect">
             <a:avLst/>
@@ -1812,7 +1927,7 @@
           <a:p>
             <a:r>
               <a:rPr lang="en-GB"/>
-              <a:t>Hands-on on how to write some example applications:</a:t>
+              <a:t>This is something Ray and I should discuss: I think many of the stuff mentioned have already been discussed but we should agree anyway :)</a:t>
             </a:r>
             <a:endParaRPr/>
           </a:p>
@@ -1822,18 +1937,159 @@
           <a:p>
             <a:r>
               <a:rPr lang="en-GB"/>
-              <a:t>We can use some of the apps we have already builtin since, IMHO, they can be used for teaching purposes.</a:t>
-            </a:r>
-            <a:endParaRPr/>
-          </a:p>
-          <a:p>
-            <a:endParaRPr/>
-          </a:p>
-          <a:p>
+              <a:t>– </a:t>
+            </a:r>
             <a:r>
               <a:rPr lang="en-GB"/>
-              <a:t>This will help us not only to show how write the apps but to show the current abilities of the Plugins SDK related with all this new stuff</a:t>
-            </a:r>
+              <a:t>Put in place the JSP support once we have already done it. This will allow you to write</a:t>
+            </a:r>
+            <a:endParaRPr/>
+          </a:p>
+          <a:p>
+            <a:endParaRPr/>
+          </a:p>
+          <a:p>
+            <a:r>
+              <a:rPr lang="en-GB"/>
+              <a:t>– </a:t>
+            </a:r>
+            <a:r>
+              <a:rPr lang="en-GB"/>
+              <a:t>Trying to apply some of the concepts previously shown in the Liferay Core: </a:t>
+            </a:r>
+            <a:endParaRPr/>
+          </a:p>
+          <a:p>
+            <a:r>
+              <a:rPr lang="en-GB"/>
+              <a:t>    – </a:t>
+            </a:r>
+            <a:r>
+              <a:rPr lang="en-GB"/>
+              <a:t>Powerful registry mechanism;</a:t>
+            </a:r>
+            <a:endParaRPr/>
+          </a:p>
+          <a:p>
+            <a:r>
+              <a:rPr lang="en-GB"/>
+              <a:t>    – </a:t>
+            </a:r>
+            <a:r>
+              <a:rPr lang="en-GB"/>
+              <a:t>Easier extensibility and reuse of components</a:t>
+            </a:r>
+            <a:endParaRPr/>
+          </a:p>
+          <a:p>
+            <a:r>
+              <a:rPr lang="en-GB"/>
+              <a:t>    – </a:t>
+            </a:r>
+            <a:r>
+              <a:rPr lang="en-GB"/>
+              <a:t>Get all the benefits from having smaller components like: less bugs, easier to maintain/rewrite, focus, distributed teams, …</a:t>
+            </a:r>
+            <a:endParaRPr/>
+          </a:p>
+          <a:p>
+            <a:endParaRPr/>
+          </a:p>
+          <a:p>
+            <a:r>
+              <a:rPr lang="en-GB"/>
+              <a:t>Some of the features I would like to have:</a:t>
+            </a:r>
+            <a:endParaRPr/>
+          </a:p>
+          <a:p>
+            <a:r>
+              <a:rPr lang="en-GB"/>
+              <a:t>  </a:t>
+            </a:r>
+            <a:endParaRPr/>
+          </a:p>
+          <a:p>
+            <a:r>
+              <a:rPr lang="en-GB"/>
+              <a:t>– </a:t>
+            </a:r>
+            <a:r>
+              <a:rPr lang="en-GB"/>
+              <a:t>Small self-contained modules, so you can remove dependencies with the traditional big application servers</a:t>
+            </a:r>
+            <a:endParaRPr/>
+          </a:p>
+          <a:p>
+            <a:endParaRPr/>
+          </a:p>
+          <a:p>
+            <a:r>
+              <a:rPr lang="en-GB"/>
+              <a:t>– </a:t>
+            </a:r>
+            <a:r>
+              <a:rPr lang="en-GB"/>
+              <a:t>Previous point will allow us to get a huge increase of our architecture's versatility</a:t>
+            </a:r>
+            <a:endParaRPr/>
+          </a:p>
+          <a:p>
+            <a:endParaRPr/>
+          </a:p>
+          <a:p>
+            <a:r>
+              <a:rPr lang="en-GB"/>
+              <a:t>– </a:t>
+            </a:r>
+            <a:r>
+              <a:rPr lang="en-GB"/>
+              <a:t>The previous point will allow us to move Liferay's resiliency and scaling to the next point: horizontal scaling (distribution), applying some of the Hystrix concepts to our services, …</a:t>
+            </a:r>
+            <a:endParaRPr/>
+          </a:p>
+          <a:p>
+            <a:endParaRPr/>
+          </a:p>
+          <a:p>
+            <a:r>
+              <a:rPr lang="en-GB"/>
+              <a:t>– </a:t>
+            </a:r>
+            <a:r>
+              <a:rPr lang="en-GB"/>
+              <a:t>Many more … we</a:t>
+            </a:r>
+            <a:endParaRPr/>
+          </a:p>
+          <a:p>
+            <a:endParaRPr/>
+          </a:p>
+          <a:p>
+            <a:endParaRPr/>
+          </a:p>
+          <a:p>
+            <a:pPr>
+              <a:lnSpc>
+                <a:spcPct val="100000"/>
+              </a:lnSpc>
+            </a:pPr>
+            <a:endParaRPr/>
+          </a:p>
+          <a:p>
+            <a:pPr>
+              <a:lnSpc>
+                <a:spcPct val="100000"/>
+              </a:lnSpc>
+            </a:pPr>
+            <a:endParaRPr/>
+          </a:p>
+          <a:p>
+            <a:pPr>
+              <a:lnSpc>
+                <a:spcPct val="100000"/>
+              </a:lnSpc>
+            </a:pPr>
             <a:endParaRPr/>
           </a:p>
         </p:txBody>
@@ -5206,7 +5462,7 @@
         <p:spPr>
           <a:xfrm>
             <a:off x="0" y="0"/>
-            <a:ext cx="9142920" cy="6856920"/>
+            <a:ext cx="9142560" cy="6856560"/>
           </a:xfrm>
           <a:prstGeom prst="rect">
             <a:avLst/>
@@ -5585,7 +5841,7 @@
         <p:spPr>
           <a:xfrm>
             <a:off x="0" y="0"/>
-            <a:ext cx="9142920" cy="6856920"/>
+            <a:ext cx="9142560" cy="6856560"/>
           </a:xfrm>
           <a:prstGeom prst="rect">
             <a:avLst/>
@@ -5776,7 +6032,7 @@
         <p:spPr>
           <a:xfrm>
             <a:off x="914400" y="2057400"/>
-            <a:ext cx="7619040" cy="684720"/>
+            <a:ext cx="7618680" cy="684360"/>
           </a:xfrm>
           <a:prstGeom prst="rect">
             <a:avLst/>
@@ -5813,7 +6069,7 @@
         <p:spPr>
           <a:xfrm>
             <a:off x="914400" y="3733920"/>
-            <a:ext cx="4723200" cy="303840"/>
+            <a:ext cx="4722840" cy="303480"/>
           </a:xfrm>
           <a:prstGeom prst="rect">
             <a:avLst/>
@@ -5849,7 +6105,7 @@
         <p:spPr>
           <a:xfrm>
             <a:off x="914400" y="2666880"/>
-            <a:ext cx="5852880" cy="608400"/>
+            <a:ext cx="5852520" cy="608040"/>
           </a:xfrm>
           <a:prstGeom prst="rect">
             <a:avLst/>
@@ -5885,7 +6141,7 @@
         <p:spPr>
           <a:xfrm>
             <a:off x="914400" y="3429000"/>
-            <a:ext cx="4723200" cy="303840"/>
+            <a:ext cx="4722840" cy="303480"/>
           </a:xfrm>
           <a:prstGeom prst="rect">
             <a:avLst/>
@@ -5980,6 +6236,65 @@
           <p:childTnLst>
             <p:seq>
               <p:cTn id="20" nodeType="mainSeq"/>
+              <p:prevCondLst>
+                <p:cond delay="0" evt="onPrev">
+                  <p:tgtEl>
+                    <p:sldTgt/>
+                  </p:tgtEl>
+                </p:cond>
+              </p:prevCondLst>
+              <p:nextCondLst>
+                <p:cond delay="0" evt="onNext">
+                  <p:tgtEl>
+                    <p:sldTgt/>
+                  </p:tgtEl>
+                </p:cond>
+              </p:nextCondLst>
+            </p:seq>
+          </p:childTnLst>
+        </p:cTn>
+      </p:par>
+    </p:tnLst>
+  </p:timing>
+</p:sld>
+</file>
+
+<file path=ppt/slides/slide11.xml><?xml version="1.0" encoding="utf-8"?>
+<p:sld xmlns:a="http://schemas.openxmlformats.org/drawingml/2006/main" xmlns:p="http://schemas.openxmlformats.org/presentationml/2006/main" xmlns:r="http://schemas.openxmlformats.org/officeDocument/2006/relationships">
+  <p:cSld>
+    <p:bg>
+      <p:bgPr>
+        <a:blipFill>
+          <a:blip r:embed="rId1"/>
+          <a:stretch>
+            <a:fillRect/>
+          </a:stretch>
+        </a:blipFill>
+      </p:bgPr>
+    </p:bg>
+    <p:spTree>
+      <p:nvGrpSpPr>
+        <p:cNvPr id="1" name=""/>
+        <p:cNvGrpSpPr/>
+        <p:nvPr/>
+      </p:nvGrpSpPr>
+      <p:grpSpPr>
+        <a:xfrm>
+          <a:off x="0" y="0"/>
+          <a:ext cx="0" cy="0"/>
+          <a:chOff x="0" y="0"/>
+          <a:chExt cx="0" cy="0"/>
+        </a:xfrm>
+      </p:grpSpPr>
+    </p:spTree>
+  </p:cSld>
+  <p:timing>
+    <p:tnLst>
+      <p:par>
+        <p:cTn dur="indefinite" id="21" nodeType="tmRoot" restart="never">
+          <p:childTnLst>
+            <p:seq>
+              <p:cTn id="22" nodeType="mainSeq"/>
               <p:prevCondLst>
                 <p:cond delay="0" evt="onPrev">
                   <p:tgtEl>
@@ -6087,7 +6402,7 @@
         </p:nvGraphicFramePr>
         <p:xfrm>
           <a:off x="648000" y="432000"/>
-          <a:ext cx="7703280" cy="5039280"/>
+          <a:ext cx="7702920" cy="5038920"/>
         </p:xfrm>
         <a:graphic>
           <a:graphicData uri="http://schemas.openxmlformats.org/drawingml/2006/chart">
@@ -6104,7 +6419,7 @@
         <p:spPr>
           <a:xfrm>
             <a:off x="612000" y="972000"/>
-            <a:ext cx="575280" cy="245160"/>
+            <a:ext cx="574920" cy="244800"/>
           </a:xfrm>
           <a:prstGeom prst="rect">
             <a:avLst/>
@@ -6130,7 +6445,7 @@
         <p:spPr>
           <a:xfrm>
             <a:off x="6480000" y="4932000"/>
-            <a:ext cx="935280" cy="400680"/>
+            <a:ext cx="934920" cy="400320"/>
           </a:xfrm>
           <a:prstGeom prst="rect">
             <a:avLst/>
@@ -6179,7 +6494,7 @@
         <p:spPr>
           <a:xfrm>
             <a:off x="5184000" y="1800000"/>
-            <a:ext cx="1223280" cy="245160"/>
+            <a:ext cx="1222920" cy="244800"/>
           </a:xfrm>
           <a:prstGeom prst="rect">
             <a:avLst/>
@@ -6363,612 +6678,28 @@
           <a:chExt cx="0" cy="0"/>
         </a:xfrm>
       </p:grpSpPr>
-      <p:sp>
-        <p:nvSpPr>
-          <p:cNvPr id="118" name="CustomShape 1"/>
-          <p:cNvSpPr/>
+      <p:pic>
+        <p:nvPicPr>
+          <p:cNvPr descr="" id="118" name=""/>
+          <p:cNvPicPr/>
           <p:nvPr/>
-        </p:nvSpPr>
-        <p:spPr>
-          <a:xfrm>
-            <a:off x="2069280" y="4472640"/>
-            <a:ext cx="5562720" cy="495360"/>
-          </a:xfrm>
-          <a:prstGeom prst="roundRect">
-            <a:avLst>
-              <a:gd fmla="val 8307" name="adj"/>
-            </a:avLst>
-          </a:prstGeom>
-          <a:solidFill>
-            <a:srgbClr val="676767"/>
-          </a:solidFill>
-          <a:ln w="25560">
-            <a:solidFill>
-              <a:srgbClr val="000000"/>
-            </a:solidFill>
-            <a:miter/>
-          </a:ln>
-        </p:spPr>
-      </p:sp>
-      <p:sp>
-        <p:nvSpPr>
-          <p:cNvPr id="119" name="CustomShape 2"/>
-          <p:cNvSpPr/>
-          <p:nvPr/>
-        </p:nvSpPr>
-        <p:spPr>
-          <a:xfrm>
-            <a:off x="6221520" y="4599720"/>
-            <a:ext cx="1410480" cy="167760"/>
-          </a:xfrm>
-          <a:prstGeom prst="rect">
-            <a:avLst/>
-          </a:prstGeom>
-        </p:spPr>
-        <p:txBody>
-          <a:bodyPr bIns="0" lIns="0" rIns="0" tIns="0" wrap="none"/>
-          <a:p>
-            <a:pPr>
-              <a:buFont typeface="StarSymbol"/>
-              <a:buChar char=""/>
-            </a:pPr>
-            <a:r>
-              <a:rPr b="1" lang="en-US" sz="1100">
-                <a:solidFill>
-                  <a:srgbClr val="ffffff"/>
-                </a:solidFill>
-                <a:ea typeface="ＭＳ Ｐゴシック"/>
-              </a:rPr>
-              <a:t>Operating system</a:t>
-            </a:r>
-            <a:endParaRPr/>
-          </a:p>
-        </p:txBody>
-      </p:sp>
-      <p:sp>
-        <p:nvSpPr>
-          <p:cNvPr id="120" name="CustomShape 3"/>
-          <p:cNvSpPr/>
-          <p:nvPr/>
-        </p:nvSpPr>
-        <p:spPr>
-          <a:xfrm>
-            <a:off x="2615400" y="3799440"/>
-            <a:ext cx="5016600" cy="495360"/>
-          </a:xfrm>
-          <a:prstGeom prst="roundRect">
-            <a:avLst>
-              <a:gd fmla="val 8307" name="adj"/>
-            </a:avLst>
-          </a:prstGeom>
-          <a:solidFill>
-            <a:srgbClr val="676767"/>
-          </a:solidFill>
-          <a:ln w="25560">
-            <a:solidFill>
-              <a:srgbClr val="000000"/>
-            </a:solidFill>
-            <a:miter/>
-          </a:ln>
-        </p:spPr>
-      </p:sp>
-      <p:sp>
-        <p:nvSpPr>
-          <p:cNvPr id="121" name="CustomShape 4"/>
-          <p:cNvSpPr/>
-          <p:nvPr/>
-        </p:nvSpPr>
-        <p:spPr>
-          <a:xfrm>
-            <a:off x="6002280" y="3926520"/>
-            <a:ext cx="1629720" cy="167760"/>
-          </a:xfrm>
-          <a:prstGeom prst="rect">
-            <a:avLst/>
-          </a:prstGeom>
-        </p:spPr>
-        <p:txBody>
-          <a:bodyPr bIns="0" lIns="0" rIns="0" tIns="0" wrap="none"/>
-          <a:p>
-            <a:pPr>
-              <a:buFont typeface="StarSymbol"/>
-              <a:buChar char=""/>
-            </a:pPr>
-            <a:r>
-              <a:rPr b="1" lang="en-US" sz="1100">
-                <a:solidFill>
-                  <a:srgbClr val="ffffff"/>
-                </a:solidFill>
-                <a:ea typeface="ＭＳ Ｐゴシック"/>
-              </a:rPr>
-              <a:t>Java Virtual Machine</a:t>
-            </a:r>
-            <a:endParaRPr/>
-          </a:p>
-        </p:txBody>
-      </p:sp>
-      <p:sp>
-        <p:nvSpPr>
-          <p:cNvPr id="122" name="CustomShape 5"/>
-          <p:cNvSpPr/>
-          <p:nvPr/>
-        </p:nvSpPr>
-        <p:spPr>
-          <a:xfrm>
-            <a:off x="3245400" y="3202560"/>
-            <a:ext cx="3746520" cy="495360"/>
-          </a:xfrm>
-          <a:prstGeom prst="roundRect">
-            <a:avLst>
-              <a:gd fmla="val 8307" name="adj"/>
-            </a:avLst>
-          </a:prstGeom>
-          <a:solidFill>
-            <a:srgbClr val="66b132"/>
-          </a:solidFill>
-          <a:ln w="25560">
-            <a:solidFill>
-              <a:srgbClr val="000000"/>
-            </a:solidFill>
-            <a:miter/>
-          </a:ln>
-        </p:spPr>
-      </p:sp>
-      <p:sp>
-        <p:nvSpPr>
-          <p:cNvPr id="123" name="CustomShape 6"/>
-          <p:cNvSpPr/>
-          <p:nvPr/>
-        </p:nvSpPr>
-        <p:spPr>
-          <a:xfrm>
-            <a:off x="5151600" y="3329640"/>
-            <a:ext cx="1840320" cy="167760"/>
-          </a:xfrm>
-          <a:prstGeom prst="rect">
-            <a:avLst/>
-          </a:prstGeom>
-        </p:spPr>
-        <p:txBody>
-          <a:bodyPr bIns="0" lIns="0" rIns="0" tIns="0" wrap="none"/>
-          <a:p>
-            <a:pPr>
-              <a:buFont typeface="StarSymbol"/>
-              <a:buChar char=""/>
-            </a:pPr>
-            <a:r>
-              <a:rPr b="1" lang="en-US" sz="1100">
-                <a:solidFill>
-                  <a:srgbClr val="ffffff"/>
-                </a:solidFill>
-                <a:ea typeface="ＭＳ Ｐゴシック"/>
-              </a:rPr>
-              <a:t>Executing environment</a:t>
-            </a:r>
-            <a:endParaRPr/>
-          </a:p>
-        </p:txBody>
-      </p:sp>
-      <p:sp>
-        <p:nvSpPr>
-          <p:cNvPr id="124" name="CustomShape 7"/>
-          <p:cNvSpPr/>
-          <p:nvPr/>
-        </p:nvSpPr>
-        <p:spPr>
-          <a:xfrm>
-            <a:off x="3804120" y="2529720"/>
-            <a:ext cx="3187800" cy="495000"/>
-          </a:xfrm>
-          <a:prstGeom prst="roundRect">
-            <a:avLst>
-              <a:gd fmla="val 8307" name="adj"/>
-            </a:avLst>
-          </a:prstGeom>
-          <a:solidFill>
-            <a:srgbClr val="66b132"/>
-          </a:solidFill>
-          <a:ln w="25560">
-            <a:solidFill>
-              <a:srgbClr val="000000"/>
-            </a:solidFill>
-            <a:miter/>
-          </a:ln>
-        </p:spPr>
-      </p:sp>
-      <p:sp>
-        <p:nvSpPr>
-          <p:cNvPr id="125" name="CustomShape 8"/>
-          <p:cNvSpPr/>
-          <p:nvPr/>
-        </p:nvSpPr>
-        <p:spPr>
-          <a:xfrm>
-            <a:off x="6326640" y="2656440"/>
-            <a:ext cx="665280" cy="167760"/>
-          </a:xfrm>
-          <a:prstGeom prst="rect">
-            <a:avLst/>
-          </a:prstGeom>
-        </p:spPr>
-        <p:txBody>
-          <a:bodyPr bIns="0" lIns="0" rIns="0" tIns="0" wrap="none"/>
-          <a:p>
-            <a:pPr>
-              <a:buFont typeface="StarSymbol"/>
-              <a:buChar char=""/>
-            </a:pPr>
-            <a:r>
-              <a:rPr b="1" lang="en-US" sz="1100">
-                <a:solidFill>
-                  <a:srgbClr val="ffffff"/>
-                </a:solidFill>
-                <a:ea typeface="ＭＳ Ｐゴシック"/>
-              </a:rPr>
-              <a:t>Modules</a:t>
-            </a:r>
-            <a:endParaRPr/>
-          </a:p>
-        </p:txBody>
-      </p:sp>
-      <p:sp>
-        <p:nvSpPr>
-          <p:cNvPr id="126" name="CustomShape 9"/>
-          <p:cNvSpPr/>
-          <p:nvPr/>
-        </p:nvSpPr>
-        <p:spPr>
-          <a:xfrm>
-            <a:off x="4312080" y="1932840"/>
-            <a:ext cx="2679840" cy="495000"/>
-          </a:xfrm>
-          <a:prstGeom prst="roundRect">
-            <a:avLst>
-              <a:gd fmla="val 8307" name="adj"/>
-            </a:avLst>
-          </a:prstGeom>
-          <a:solidFill>
-            <a:srgbClr val="66b132"/>
-          </a:solidFill>
-          <a:ln w="25560">
-            <a:solidFill>
-              <a:srgbClr val="000000"/>
-            </a:solidFill>
-            <a:miter/>
-          </a:ln>
-        </p:spPr>
-      </p:sp>
-      <p:sp>
-        <p:nvSpPr>
-          <p:cNvPr id="127" name="CustomShape 10"/>
-          <p:cNvSpPr/>
-          <p:nvPr/>
-        </p:nvSpPr>
-        <p:spPr>
-          <a:xfrm>
-            <a:off x="6242760" y="2059560"/>
-            <a:ext cx="749160" cy="241560"/>
-          </a:xfrm>
-          <a:prstGeom prst="rect">
-            <a:avLst/>
-          </a:prstGeom>
-        </p:spPr>
-        <p:txBody>
-          <a:bodyPr bIns="0" lIns="0" rIns="0" tIns="0"/>
-          <a:p>
-            <a:pPr>
-              <a:buFont typeface="StarSymbol"/>
-              <a:buChar char=""/>
-            </a:pPr>
-            <a:r>
-              <a:rPr b="1" lang="en-US" sz="1100">
-                <a:solidFill>
-                  <a:srgbClr val="ffffff"/>
-                </a:solidFill>
-                <a:ea typeface="ＭＳ Ｐゴシック"/>
-              </a:rPr>
-              <a:t>Lifecycle</a:t>
-            </a:r>
-            <a:endParaRPr/>
-          </a:p>
-        </p:txBody>
-      </p:sp>
-      <p:sp>
-        <p:nvSpPr>
-          <p:cNvPr id="128" name="CustomShape 11"/>
-          <p:cNvSpPr/>
-          <p:nvPr/>
-        </p:nvSpPr>
-        <p:spPr>
-          <a:xfrm>
-            <a:off x="4972680" y="1323000"/>
-            <a:ext cx="2019240" cy="495360"/>
-          </a:xfrm>
-          <a:prstGeom prst="roundRect">
-            <a:avLst>
-              <a:gd fmla="val 8307" name="adj"/>
-            </a:avLst>
-          </a:prstGeom>
-          <a:solidFill>
-            <a:srgbClr val="66b132"/>
-          </a:solidFill>
-          <a:ln w="25560">
-            <a:solidFill>
-              <a:srgbClr val="000000"/>
-            </a:solidFill>
-            <a:miter/>
-          </a:ln>
-        </p:spPr>
-      </p:sp>
-      <p:sp>
-        <p:nvSpPr>
-          <p:cNvPr id="129" name="CustomShape 12"/>
-          <p:cNvSpPr/>
-          <p:nvPr/>
-        </p:nvSpPr>
-        <p:spPr>
-          <a:xfrm>
-            <a:off x="6325200" y="1450080"/>
-            <a:ext cx="666720" cy="167760"/>
-          </a:xfrm>
-          <a:prstGeom prst="rect">
-            <a:avLst/>
-          </a:prstGeom>
-        </p:spPr>
-        <p:txBody>
-          <a:bodyPr bIns="0" lIns="0" rIns="0" tIns="0" wrap="none"/>
-          <a:p>
-            <a:pPr>
-              <a:buFont typeface="StarSymbol"/>
-              <a:buChar char=""/>
-            </a:pPr>
-            <a:r>
-              <a:rPr b="1" lang="en-US" sz="1100">
-                <a:solidFill>
-                  <a:srgbClr val="ffffff"/>
-                </a:solidFill>
-                <a:ea typeface="ＭＳ Ｐゴシック"/>
-              </a:rPr>
-              <a:t>Services</a:t>
-            </a:r>
-            <a:endParaRPr/>
-          </a:p>
-        </p:txBody>
-      </p:sp>
-      <p:sp>
-        <p:nvSpPr>
-          <p:cNvPr id="130" name="CustomShape 13"/>
-          <p:cNvSpPr/>
-          <p:nvPr/>
-        </p:nvSpPr>
-        <p:spPr>
-          <a:xfrm>
-            <a:off x="7080480" y="1310400"/>
-            <a:ext cx="507960" cy="2438280"/>
-          </a:xfrm>
-          <a:prstGeom prst="roundRect">
-            <a:avLst>
-              <a:gd fmla="val 8100" name="adj"/>
-            </a:avLst>
-          </a:prstGeom>
-          <a:solidFill>
-            <a:srgbClr val="d90b00"/>
-          </a:solidFill>
-          <a:ln w="25560">
-            <a:solidFill>
-              <a:srgbClr val="000000"/>
-            </a:solidFill>
-            <a:miter/>
-          </a:ln>
-        </p:spPr>
-      </p:sp>
-      <p:sp>
-        <p:nvSpPr>
-          <p:cNvPr id="131" name="CustomShape 14"/>
-          <p:cNvSpPr/>
-          <p:nvPr/>
-        </p:nvSpPr>
-        <p:spPr>
-          <a:xfrm>
-            <a:off x="7270920" y="1729440"/>
-            <a:ext cx="126720" cy="1397160"/>
-          </a:xfrm>
-          <a:prstGeom prst="rect">
-            <a:avLst/>
-          </a:prstGeom>
-        </p:spPr>
-        <p:txBody>
-          <a:bodyPr bIns="0" lIns="0" rIns="0" tIns="0"/>
-          <a:p>
-            <a:pPr>
-              <a:buFont typeface="StarSymbol"/>
-              <a:buChar char=""/>
-            </a:pPr>
-            <a:r>
-              <a:rPr b="1" lang="en-US" sz="1100">
-                <a:solidFill>
-                  <a:srgbClr val="ffffff"/>
-                </a:solidFill>
-                <a:ea typeface="ＭＳ Ｐゴシック"/>
-              </a:rPr>
-              <a:t>S</a:t>
-            </a:r>
-            <a:endParaRPr/>
-          </a:p>
-          <a:p>
-            <a:pPr>
-              <a:buFont typeface="StarSymbol"/>
-              <a:buChar char=""/>
-            </a:pPr>
-            <a:r>
-              <a:rPr b="1" lang="en-US" sz="1100">
-                <a:solidFill>
-                  <a:srgbClr val="ffffff"/>
-                </a:solidFill>
-                <a:ea typeface="ＭＳ Ｐゴシック"/>
-              </a:rPr>
-              <a:t>e</a:t>
-            </a:r>
-            <a:endParaRPr/>
-          </a:p>
-          <a:p>
-            <a:pPr>
-              <a:buFont typeface="StarSymbol"/>
-              <a:buChar char=""/>
-            </a:pPr>
-            <a:r>
-              <a:rPr b="1" lang="en-US" sz="1100">
-                <a:solidFill>
-                  <a:srgbClr val="ffffff"/>
-                </a:solidFill>
-                <a:ea typeface="ＭＳ Ｐゴシック"/>
-              </a:rPr>
-              <a:t>c</a:t>
-            </a:r>
-            <a:endParaRPr/>
-          </a:p>
-          <a:p>
-            <a:pPr>
-              <a:buFont typeface="StarSymbol"/>
-              <a:buChar char=""/>
-            </a:pPr>
-            <a:r>
-              <a:rPr b="1" lang="en-US" sz="1100">
-                <a:solidFill>
-                  <a:srgbClr val="ffffff"/>
-                </a:solidFill>
-                <a:ea typeface="ＭＳ Ｐゴシック"/>
-              </a:rPr>
-              <a:t>u</a:t>
-            </a:r>
-            <a:endParaRPr/>
-          </a:p>
-          <a:p>
-            <a:pPr>
-              <a:buFont typeface="StarSymbol"/>
-              <a:buChar char=""/>
-            </a:pPr>
-            <a:r>
-              <a:rPr b="1" lang="en-US" sz="1100">
-                <a:solidFill>
-                  <a:srgbClr val="ffffff"/>
-                </a:solidFill>
-                <a:ea typeface="ＭＳ Ｐゴシック"/>
-              </a:rPr>
-              <a:t>r</a:t>
-            </a:r>
-            <a:endParaRPr/>
-          </a:p>
-          <a:p>
-            <a:pPr>
-              <a:buFont typeface="StarSymbol"/>
-              <a:buChar char=""/>
-            </a:pPr>
-            <a:r>
-              <a:rPr b="1" lang="en-US" sz="1100">
-                <a:solidFill>
-                  <a:srgbClr val="ffffff"/>
-                </a:solidFill>
-                <a:ea typeface="ＭＳ Ｐゴシック"/>
-              </a:rPr>
-              <a:t>i</a:t>
-            </a:r>
-            <a:endParaRPr/>
-          </a:p>
-          <a:p>
-            <a:pPr>
-              <a:buFont typeface="StarSymbol"/>
-              <a:buChar char=""/>
-            </a:pPr>
-            <a:r>
-              <a:rPr b="1" lang="en-US" sz="1100">
-                <a:solidFill>
-                  <a:srgbClr val="ffffff"/>
-                </a:solidFill>
-                <a:ea typeface="ＭＳ Ｐゴシック"/>
-              </a:rPr>
-              <a:t>t</a:t>
-            </a:r>
-            <a:endParaRPr/>
-          </a:p>
-          <a:p>
-            <a:pPr>
-              <a:buFont typeface="StarSymbol"/>
-              <a:buChar char=""/>
-            </a:pPr>
-            <a:r>
-              <a:rPr b="1" lang="en-US" sz="1100">
-                <a:solidFill>
-                  <a:srgbClr val="ffffff"/>
-                </a:solidFill>
-                <a:ea typeface="ＭＳ Ｐゴシック"/>
-              </a:rPr>
-              <a:t>y</a:t>
-            </a:r>
-            <a:endParaRPr/>
-          </a:p>
-        </p:txBody>
-      </p:sp>
-      <p:sp>
-        <p:nvSpPr>
-          <p:cNvPr id="132" name="CustomShape 15"/>
-          <p:cNvSpPr/>
-          <p:nvPr/>
-        </p:nvSpPr>
-        <p:spPr>
-          <a:xfrm>
-            <a:off x="1255320" y="891360"/>
-            <a:ext cx="6235560" cy="4051080"/>
-          </a:xfrm>
-          <a:prstGeom prst="rect">
-            <a:avLst/>
-          </a:prstGeom>
-          <a:solidFill>
-            <a:srgbClr val="00bafb"/>
-          </a:solidFill>
-          <a:ln w="38160">
-            <a:solidFill>
-              <a:srgbClr val="000000"/>
-            </a:solidFill>
-            <a:miter/>
-          </a:ln>
-        </p:spPr>
-      </p:sp>
-      <p:sp>
-        <p:nvSpPr>
-          <p:cNvPr id="133" name="CustomShape 16"/>
-          <p:cNvSpPr/>
-          <p:nvPr/>
-        </p:nvSpPr>
-        <p:spPr>
-          <a:xfrm>
-            <a:off x="2058120" y="2059560"/>
-            <a:ext cx="1032480" cy="274680"/>
-          </a:xfrm>
-          <a:prstGeom prst="rect">
-            <a:avLst/>
-          </a:prstGeom>
-        </p:spPr>
-        <p:txBody>
-          <a:bodyPr bIns="0" lIns="0" rIns="0" tIns="0" wrap="none"/>
-          <a:p>
-            <a:pPr>
-              <a:buFont typeface="StarSymbol"/>
-              <a:buChar char=""/>
-            </a:pPr>
-            <a:r>
-              <a:rPr b="1" lang="en-US">
-                <a:solidFill>
-                  <a:srgbClr val="ffffff"/>
-                </a:solidFill>
-                <a:ea typeface="ＭＳ Ｐゴシック"/>
-              </a:rPr>
-              <a:t>Bundles</a:t>
-            </a:r>
-            <a:endParaRPr/>
-          </a:p>
-        </p:txBody>
-      </p:sp>
+        </p:nvPicPr>
+        <p:blipFill>
+          <a:blip r:embed="rId1"/>
+          <a:stretch>
+            <a:fillRect/>
+          </a:stretch>
+        </p:blipFill>
+        <p:spPr>
+          <a:xfrm>
+            <a:off x="504000" y="523440"/>
+            <a:ext cx="7632000" cy="5020560"/>
+          </a:xfrm>
+          <a:prstGeom prst="rect">
+            <a:avLst/>
+          </a:prstGeom>
+        </p:spPr>
+      </p:pic>
     </p:spTree>
   </p:cSld>
   <p:timing>
@@ -7018,812 +6749,28 @@
           <a:chExt cx="0" cy="0"/>
         </a:xfrm>
       </p:grpSpPr>
-      <p:sp>
-        <p:nvSpPr>
-          <p:cNvPr id="134" name="CustomShape 1"/>
-          <p:cNvSpPr/>
+      <p:pic>
+        <p:nvPicPr>
+          <p:cNvPr descr="" id="119" name=""/>
+          <p:cNvPicPr/>
           <p:nvPr/>
-        </p:nvSpPr>
-        <p:spPr>
-          <a:xfrm>
-            <a:off x="756000" y="648360"/>
-            <a:ext cx="252000" cy="281160"/>
-          </a:xfrm>
-          <a:prstGeom prst="flowChartConnector">
-            <a:avLst/>
-          </a:prstGeom>
-          <a:solidFill>
-            <a:srgbClr val="0000ff"/>
-          </a:solidFill>
-          <a:ln>
-            <a:solidFill>
-              <a:srgbClr val="3465af"/>
-            </a:solidFill>
-          </a:ln>
-        </p:spPr>
-      </p:sp>
-      <p:sp>
-        <p:nvSpPr>
-          <p:cNvPr id="135" name="CustomShape 2"/>
-          <p:cNvSpPr/>
-          <p:nvPr/>
-        </p:nvSpPr>
-        <p:spPr>
-          <a:xfrm>
-            <a:off x="1332000" y="1260360"/>
-            <a:ext cx="1512000" cy="504000"/>
-          </a:xfrm>
-          <a:prstGeom prst="flowChartAlternateProcess">
-            <a:avLst/>
-          </a:prstGeom>
-          <a:solidFill>
-            <a:srgbClr val="579d1c"/>
-          </a:solidFill>
-          <a:ln w="108000">
-            <a:solidFill>
-              <a:srgbClr val="ffffff"/>
-            </a:solidFill>
-            <a:round/>
-          </a:ln>
-        </p:spPr>
-      </p:sp>
-      <p:sp>
-        <p:nvSpPr>
-          <p:cNvPr id="136" name="TextShape 3"/>
-          <p:cNvSpPr txBox="1"/>
-          <p:nvPr/>
-        </p:nvSpPr>
-        <p:spPr>
-          <a:xfrm>
-            <a:off x="1476000" y="1390680"/>
-            <a:ext cx="1224000" cy="265680"/>
-          </a:xfrm>
-          <a:prstGeom prst="rect">
-            <a:avLst/>
-          </a:prstGeom>
-        </p:spPr>
-        <p:txBody>
-          <a:bodyPr bIns="45000" lIns="90000" rIns="90000" tIns="45000" wrap="none"/>
-          <a:p>
-            <a:r>
-              <a:rPr b="1" lang="en-GB" sz="1100">
-                <a:solidFill>
-                  <a:srgbClr val="ffffff"/>
-                </a:solidFill>
-              </a:rPr>
-              <a:t>INSTALLED</a:t>
-            </a:r>
-            <a:endParaRPr/>
-          </a:p>
-        </p:txBody>
-      </p:sp>
-      <p:sp>
-        <p:nvSpPr>
-          <p:cNvPr id="137" name="CustomShape 4"/>
-          <p:cNvSpPr/>
-          <p:nvPr/>
-        </p:nvSpPr>
-        <p:spPr>
-          <a:xfrm>
-            <a:off x="1332000" y="2556360"/>
-            <a:ext cx="1512000" cy="504000"/>
-          </a:xfrm>
-          <a:prstGeom prst="flowChartAlternateProcess">
-            <a:avLst/>
-          </a:prstGeom>
-          <a:solidFill>
-            <a:srgbClr val="579d1c"/>
-          </a:solidFill>
-          <a:ln w="108000">
-            <a:solidFill>
-              <a:srgbClr val="ffffff"/>
-            </a:solidFill>
-            <a:round/>
-          </a:ln>
-        </p:spPr>
-      </p:sp>
-      <p:sp>
-        <p:nvSpPr>
-          <p:cNvPr id="138" name="TextShape 5"/>
-          <p:cNvSpPr txBox="1"/>
-          <p:nvPr/>
-        </p:nvSpPr>
-        <p:spPr>
-          <a:xfrm>
-            <a:off x="1476000" y="2686680"/>
-            <a:ext cx="1224000" cy="265680"/>
-          </a:xfrm>
-          <a:prstGeom prst="rect">
-            <a:avLst/>
-          </a:prstGeom>
-        </p:spPr>
-        <p:txBody>
-          <a:bodyPr bIns="45000" lIns="90000" rIns="90000" tIns="45000" wrap="none"/>
-          <a:p>
-            <a:r>
-              <a:rPr b="1" lang="en-GB" sz="1100">
-                <a:solidFill>
-                  <a:srgbClr val="ffffff"/>
-                </a:solidFill>
-              </a:rPr>
-              <a:t>RESOLVED</a:t>
-            </a:r>
-            <a:endParaRPr/>
-          </a:p>
-        </p:txBody>
-      </p:sp>
-      <p:sp>
-        <p:nvSpPr>
-          <p:cNvPr id="139" name="CustomShape 6"/>
-          <p:cNvSpPr/>
-          <p:nvPr/>
-        </p:nvSpPr>
-        <p:spPr>
-          <a:xfrm>
-            <a:off x="1332000" y="4176360"/>
-            <a:ext cx="1512000" cy="504000"/>
-          </a:xfrm>
-          <a:prstGeom prst="flowChartAlternateProcess">
-            <a:avLst/>
-          </a:prstGeom>
-          <a:solidFill>
-            <a:srgbClr val="579d1c"/>
-          </a:solidFill>
-          <a:ln w="108000">
-            <a:solidFill>
-              <a:srgbClr val="ffffff"/>
-            </a:solidFill>
-            <a:round/>
-          </a:ln>
-        </p:spPr>
-      </p:sp>
-      <p:sp>
-        <p:nvSpPr>
-          <p:cNvPr id="140" name="TextShape 7"/>
-          <p:cNvSpPr txBox="1"/>
-          <p:nvPr/>
-        </p:nvSpPr>
-        <p:spPr>
-          <a:xfrm>
-            <a:off x="1440000" y="4306680"/>
-            <a:ext cx="1296000" cy="265680"/>
-          </a:xfrm>
-          <a:prstGeom prst="rect">
-            <a:avLst/>
-          </a:prstGeom>
-        </p:spPr>
-        <p:txBody>
-          <a:bodyPr bIns="45000" lIns="90000" rIns="90000" tIns="45000" wrap="none"/>
-          <a:p>
-            <a:r>
-              <a:rPr b="1" lang="en-GB" sz="1100">
-                <a:solidFill>
-                  <a:srgbClr val="ffffff"/>
-                </a:solidFill>
-              </a:rPr>
-              <a:t>UNINSTALLED</a:t>
-            </a:r>
-            <a:endParaRPr/>
-          </a:p>
-        </p:txBody>
-      </p:sp>
-      <p:sp>
-        <p:nvSpPr>
-          <p:cNvPr id="141" name="CustomShape 8"/>
-          <p:cNvSpPr/>
-          <p:nvPr/>
-        </p:nvSpPr>
-        <p:spPr>
-          <a:xfrm>
-            <a:off x="6354000" y="1368360"/>
-            <a:ext cx="1512000" cy="504000"/>
-          </a:xfrm>
-          <a:prstGeom prst="flowChartAlternateProcess">
-            <a:avLst/>
-          </a:prstGeom>
-          <a:solidFill>
-            <a:srgbClr val="579d1c"/>
-          </a:solidFill>
-          <a:ln w="108000">
-            <a:solidFill>
-              <a:srgbClr val="ffffff"/>
-            </a:solidFill>
-            <a:round/>
-          </a:ln>
-        </p:spPr>
-      </p:sp>
-      <p:sp>
-        <p:nvSpPr>
-          <p:cNvPr id="142" name="TextShape 9"/>
-          <p:cNvSpPr txBox="1"/>
-          <p:nvPr/>
-        </p:nvSpPr>
-        <p:spPr>
-          <a:xfrm>
-            <a:off x="6498000" y="1498680"/>
-            <a:ext cx="1224000" cy="265680"/>
-          </a:xfrm>
-          <a:prstGeom prst="rect">
-            <a:avLst/>
-          </a:prstGeom>
-        </p:spPr>
-        <p:txBody>
-          <a:bodyPr bIns="45000" lIns="90000" rIns="90000" tIns="45000" wrap="none"/>
-          <a:p>
-            <a:r>
-              <a:rPr b="1" lang="en-GB" sz="1100">
-                <a:solidFill>
-                  <a:srgbClr val="ffffff"/>
-                </a:solidFill>
-              </a:rPr>
-              <a:t>STARTING</a:t>
-            </a:r>
-            <a:endParaRPr/>
-          </a:p>
-        </p:txBody>
-      </p:sp>
-      <p:sp>
-        <p:nvSpPr>
-          <p:cNvPr id="143" name="CustomShape 10"/>
-          <p:cNvSpPr/>
-          <p:nvPr/>
-        </p:nvSpPr>
-        <p:spPr>
-          <a:xfrm>
-            <a:off x="6354000" y="2592360"/>
-            <a:ext cx="1512000" cy="504000"/>
-          </a:xfrm>
-          <a:prstGeom prst="flowChartAlternateProcess">
-            <a:avLst/>
-          </a:prstGeom>
-          <a:solidFill>
-            <a:srgbClr val="579d1c"/>
-          </a:solidFill>
-          <a:ln w="108000">
-            <a:solidFill>
-              <a:srgbClr val="ffffff"/>
-            </a:solidFill>
-            <a:round/>
-          </a:ln>
-        </p:spPr>
-      </p:sp>
-      <p:sp>
-        <p:nvSpPr>
-          <p:cNvPr id="144" name="TextShape 11"/>
-          <p:cNvSpPr txBox="1"/>
-          <p:nvPr/>
-        </p:nvSpPr>
-        <p:spPr>
-          <a:xfrm>
-            <a:off x="6498000" y="2722680"/>
-            <a:ext cx="1224000" cy="265680"/>
-          </a:xfrm>
-          <a:prstGeom prst="rect">
-            <a:avLst/>
-          </a:prstGeom>
-        </p:spPr>
-        <p:txBody>
-          <a:bodyPr bIns="45000" lIns="90000" rIns="90000" tIns="45000" wrap="none"/>
-          <a:p>
-            <a:r>
-              <a:rPr b="1" lang="en-GB" sz="1100">
-                <a:solidFill>
-                  <a:srgbClr val="ffffff"/>
-                </a:solidFill>
-              </a:rPr>
-              <a:t>ACTIVE</a:t>
-            </a:r>
-            <a:endParaRPr/>
-          </a:p>
-        </p:txBody>
-      </p:sp>
-      <p:sp>
-        <p:nvSpPr>
-          <p:cNvPr id="145" name="CustomShape 12"/>
-          <p:cNvSpPr/>
-          <p:nvPr/>
-        </p:nvSpPr>
-        <p:spPr>
-          <a:xfrm>
-            <a:off x="6354000" y="3888360"/>
-            <a:ext cx="1512000" cy="504000"/>
-          </a:xfrm>
-          <a:prstGeom prst="flowChartAlternateProcess">
-            <a:avLst/>
-          </a:prstGeom>
-          <a:solidFill>
-            <a:srgbClr val="579d1c"/>
-          </a:solidFill>
-          <a:ln w="108000">
-            <a:solidFill>
-              <a:srgbClr val="ffffff"/>
-            </a:solidFill>
-            <a:round/>
-          </a:ln>
-        </p:spPr>
-      </p:sp>
-      <p:sp>
-        <p:nvSpPr>
-          <p:cNvPr id="146" name="TextShape 13"/>
-          <p:cNvSpPr txBox="1"/>
-          <p:nvPr/>
-        </p:nvSpPr>
-        <p:spPr>
-          <a:xfrm>
-            <a:off x="6498000" y="4018680"/>
-            <a:ext cx="1224000" cy="265680"/>
-          </a:xfrm>
-          <a:prstGeom prst="rect">
-            <a:avLst/>
-          </a:prstGeom>
-        </p:spPr>
-        <p:txBody>
-          <a:bodyPr bIns="45000" lIns="90000" rIns="90000" tIns="45000" wrap="none"/>
-          <a:p>
-            <a:r>
-              <a:rPr b="1" lang="en-GB" sz="1100">
-                <a:solidFill>
-                  <a:srgbClr val="ffffff"/>
-                </a:solidFill>
-              </a:rPr>
-              <a:t>STOPPING</a:t>
-            </a:r>
-            <a:endParaRPr/>
-          </a:p>
-        </p:txBody>
-      </p:sp>
-      <p:cxnSp>
-        <p:nvCxnSpPr>
-          <p:cNvPr id="147" name="Line 14"/>
-          <p:cNvCxnSpPr>
-            <a:stCxn id="134" idx="6"/>
-            <a:endCxn id="135" idx="0"/>
-          </p:cNvCxnSpPr>
-          <p:nvPr/>
-        </p:nvCxnSpPr>
-        <p:spPr>
-          <a:xfrm>
-            <a:off x="1008000" y="789120"/>
-            <a:ext cx="1080360" cy="471600"/>
-          </a:xfrm>
-          <a:prstGeom prst="straightConnector1">
-            <a:avLst/>
-          </a:prstGeom>
-          <a:ln>
-            <a:solidFill>
-              <a:srgbClr val="000000"/>
-            </a:solidFill>
-            <a:tailEnd len="med" type="triangle" w="med"/>
-          </a:ln>
-        </p:spPr>
-      </p:cxnSp>
-      <p:sp>
-        <p:nvSpPr>
-          <p:cNvPr id="148" name="Line 15"/>
-          <p:cNvSpPr/>
-          <p:nvPr/>
-        </p:nvSpPr>
-        <p:spPr>
-          <a:xfrm>
-            <a:off x="1656000" y="1692360"/>
-            <a:ext cx="0" cy="900000"/>
-          </a:xfrm>
-          <a:prstGeom prst="line">
-            <a:avLst/>
-          </a:prstGeom>
-          <a:ln>
-            <a:solidFill>
-              <a:srgbClr val="000000"/>
-            </a:solidFill>
-            <a:tailEnd len="med" type="triangle" w="med"/>
-          </a:ln>
-        </p:spPr>
-      </p:sp>
-      <p:sp>
-        <p:nvSpPr>
-          <p:cNvPr id="149" name="Line 16"/>
-          <p:cNvSpPr/>
-          <p:nvPr/>
-        </p:nvSpPr>
-        <p:spPr>
-          <a:xfrm flipV="1">
-            <a:off x="2376000" y="1692360"/>
-            <a:ext cx="0" cy="936000"/>
-          </a:xfrm>
-          <a:prstGeom prst="line">
-            <a:avLst/>
-          </a:prstGeom>
-          <a:ln>
-            <a:solidFill>
-              <a:srgbClr val="000000"/>
-            </a:solidFill>
-            <a:tailEnd len="med" type="triangle" w="med"/>
-          </a:ln>
-        </p:spPr>
-      </p:sp>
-      <p:cxnSp>
-        <p:nvCxnSpPr>
-          <p:cNvPr id="150" name="Line 17"/>
-          <p:cNvCxnSpPr>
-            <a:stCxn id="135" idx="1"/>
-            <a:endCxn id="139" idx="1"/>
-          </p:cNvCxnSpPr>
-          <p:nvPr/>
-        </p:nvCxnSpPr>
-        <p:spPr>
-          <a:xfrm>
-            <a:off x="1332000" y="1512360"/>
-            <a:ext cx="360" cy="2916360"/>
-          </a:xfrm>
-          <a:prstGeom prst="bentConnector3">
-            <a:avLst/>
-          </a:prstGeom>
-          <a:ln>
-            <a:solidFill>
-              <a:srgbClr val="000000"/>
-            </a:solidFill>
-            <a:tailEnd len="med" type="triangle" w="med"/>
-          </a:ln>
-        </p:spPr>
-      </p:cxnSp>
-      <p:cxnSp>
-        <p:nvCxnSpPr>
-          <p:cNvPr id="151" name="Line 18"/>
-          <p:cNvCxnSpPr>
-            <a:stCxn id="137" idx="3"/>
-            <a:endCxn id="141" idx="1"/>
-          </p:cNvCxnSpPr>
-          <p:nvPr/>
-        </p:nvCxnSpPr>
-        <p:spPr>
-          <a:xfrm flipV="1">
-            <a:off x="2844000" y="1620360"/>
-            <a:ext cx="3510360" cy="1188360"/>
-          </a:xfrm>
-          <a:prstGeom prst="straightConnector1">
-            <a:avLst/>
-          </a:prstGeom>
-          <a:ln>
-            <a:solidFill>
-              <a:srgbClr val="000000"/>
-            </a:solidFill>
-            <a:tailEnd len="med" type="triangle" w="med"/>
-          </a:ln>
-        </p:spPr>
-      </p:cxnSp>
-      <p:cxnSp>
-        <p:nvCxnSpPr>
-          <p:cNvPr id="152" name="Line 19"/>
-          <p:cNvCxnSpPr>
-            <a:stCxn id="141" idx="2"/>
-            <a:endCxn id="143" idx="0"/>
-          </p:cNvCxnSpPr>
-          <p:nvPr/>
-        </p:nvCxnSpPr>
-        <p:spPr>
-          <a:xfrm>
-            <a:off x="7110000" y="1872360"/>
-            <a:ext cx="360" cy="720360"/>
-          </a:xfrm>
-          <a:prstGeom prst="straightConnector1">
-            <a:avLst/>
-          </a:prstGeom>
-          <a:ln>
-            <a:solidFill>
-              <a:srgbClr val="000000"/>
-            </a:solidFill>
-            <a:tailEnd len="med" type="triangle" w="med"/>
-          </a:ln>
-        </p:spPr>
-      </p:cxnSp>
-      <p:cxnSp>
-        <p:nvCxnSpPr>
-          <p:cNvPr id="153" name="Line 20"/>
-          <p:cNvCxnSpPr>
-            <a:stCxn id="143" idx="2"/>
-            <a:endCxn id="145" idx="0"/>
-          </p:cNvCxnSpPr>
-          <p:nvPr/>
-        </p:nvCxnSpPr>
-        <p:spPr>
-          <a:xfrm>
-            <a:off x="7110000" y="3096360"/>
-            <a:ext cx="360" cy="792360"/>
-          </a:xfrm>
-          <a:prstGeom prst="straightConnector1">
-            <a:avLst/>
-          </a:prstGeom>
-          <a:ln>
-            <a:solidFill>
-              <a:srgbClr val="000000"/>
-            </a:solidFill>
-            <a:tailEnd len="med" type="triangle" w="med"/>
-          </a:ln>
-        </p:spPr>
-      </p:cxnSp>
-      <p:cxnSp>
-        <p:nvCxnSpPr>
-          <p:cNvPr id="154" name="Line 21"/>
-          <p:cNvCxnSpPr>
-            <a:stCxn id="145" idx="1"/>
-            <a:endCxn id="137" idx="3"/>
-          </p:cNvCxnSpPr>
-          <p:nvPr/>
-        </p:nvCxnSpPr>
-        <p:spPr>
-          <a:xfrm flipH="1" flipV="1">
-            <a:off x="2844000" y="2808360"/>
-            <a:ext cx="3510360" cy="1332360"/>
-          </a:xfrm>
-          <a:prstGeom prst="straightConnector1">
-            <a:avLst/>
-          </a:prstGeom>
-          <a:ln>
-            <a:solidFill>
-              <a:srgbClr val="000000"/>
-            </a:solidFill>
-            <a:tailEnd len="med" type="triangle" w="med"/>
-          </a:ln>
-        </p:spPr>
-      </p:cxnSp>
-      <p:sp>
-        <p:nvSpPr>
-          <p:cNvPr id="155" name="TextShape 22"/>
-          <p:cNvSpPr txBox="1"/>
-          <p:nvPr/>
-        </p:nvSpPr>
-        <p:spPr>
-          <a:xfrm>
-            <a:off x="720000" y="1032840"/>
-            <a:ext cx="864000" cy="218520"/>
-          </a:xfrm>
-          <a:prstGeom prst="rect">
-            <a:avLst/>
-          </a:prstGeom>
-        </p:spPr>
-        <p:txBody>
-          <a:bodyPr bIns="45000" lIns="90000" rIns="90000" tIns="45000" wrap="none"/>
-          <a:p>
-            <a:r>
-              <a:rPr lang="en-GB" sz="900"/>
-              <a:t>INSTALL</a:t>
-            </a:r>
-            <a:endParaRPr/>
-          </a:p>
-        </p:txBody>
-      </p:sp>
-      <p:sp>
-        <p:nvSpPr>
-          <p:cNvPr id="156" name="TextShape 23"/>
-          <p:cNvSpPr txBox="1"/>
-          <p:nvPr/>
-        </p:nvSpPr>
-        <p:spPr>
-          <a:xfrm>
-            <a:off x="72000" y="2550600"/>
-            <a:ext cx="1026000" cy="218520"/>
-          </a:xfrm>
-          <a:prstGeom prst="rect">
-            <a:avLst/>
-          </a:prstGeom>
-        </p:spPr>
-        <p:txBody>
-          <a:bodyPr bIns="45000" lIns="90000" rIns="90000" tIns="45000" wrap="none"/>
-          <a:p>
-            <a:r>
-              <a:rPr lang="en-GB" sz="900"/>
-              <a:t>UNINSTALL</a:t>
-            </a:r>
-            <a:endParaRPr/>
-          </a:p>
-        </p:txBody>
-      </p:sp>
-      <p:cxnSp>
-        <p:nvCxnSpPr>
-          <p:cNvPr id="157" name="Line 24"/>
-          <p:cNvCxnSpPr>
-            <a:stCxn id="137" idx="2"/>
-            <a:endCxn id="139" idx="0"/>
-          </p:cNvCxnSpPr>
-          <p:nvPr/>
-        </p:nvCxnSpPr>
-        <p:spPr>
-          <a:xfrm>
-            <a:off x="2088000" y="3060360"/>
-            <a:ext cx="360" cy="1116360"/>
-          </a:xfrm>
-          <a:prstGeom prst="straightConnector1">
-            <a:avLst/>
-          </a:prstGeom>
-          <a:ln>
-            <a:solidFill>
-              <a:srgbClr val="000000"/>
-            </a:solidFill>
-            <a:tailEnd len="med" type="triangle" w="med"/>
-          </a:ln>
-        </p:spPr>
-      </p:cxnSp>
-      <p:sp>
-        <p:nvSpPr>
-          <p:cNvPr id="158" name="TextShape 25"/>
-          <p:cNvSpPr txBox="1"/>
-          <p:nvPr/>
-        </p:nvSpPr>
-        <p:spPr>
-          <a:xfrm>
-            <a:off x="864000" y="1800360"/>
-            <a:ext cx="1026000" cy="218520"/>
-          </a:xfrm>
-          <a:prstGeom prst="rect">
-            <a:avLst/>
-          </a:prstGeom>
-        </p:spPr>
-        <p:txBody>
-          <a:bodyPr bIns="45000" lIns="90000" rIns="90000" tIns="45000" wrap="none"/>
-          <a:p>
-            <a:r>
-              <a:rPr lang="en-GB" sz="900"/>
-              <a:t>RESOLVE</a:t>
-            </a:r>
-            <a:endParaRPr/>
-          </a:p>
-        </p:txBody>
-      </p:sp>
-      <p:sp>
-        <p:nvSpPr>
-          <p:cNvPr id="159" name="TextShape 26"/>
-          <p:cNvSpPr txBox="1"/>
-          <p:nvPr/>
-        </p:nvSpPr>
-        <p:spPr>
-          <a:xfrm>
-            <a:off x="2232000" y="2004840"/>
-            <a:ext cx="1026000" cy="346680"/>
-          </a:xfrm>
-          <a:prstGeom prst="rect">
-            <a:avLst/>
-          </a:prstGeom>
-        </p:spPr>
-        <p:txBody>
-          <a:bodyPr bIns="45000" lIns="90000" rIns="90000" tIns="45000" wrap="none"/>
-          <a:p>
-            <a:r>
-              <a:rPr lang="en-GB" sz="900"/>
-              <a:t>REFRESH, UPDATE</a:t>
-            </a:r>
-            <a:endParaRPr/>
-          </a:p>
-        </p:txBody>
-      </p:sp>
-      <p:cxnSp>
-        <p:nvCxnSpPr>
-          <p:cNvPr id="160" name="Line 27"/>
-          <p:cNvCxnSpPr>
-            <a:stCxn id="135" idx="0"/>
-            <a:endCxn id="135" idx="3"/>
-          </p:cNvCxnSpPr>
-          <p:nvPr/>
-        </p:nvCxnSpPr>
-        <p:spPr>
-          <a:xfrm>
-            <a:off x="2088000" y="1260360"/>
-            <a:ext cx="756360" cy="252360"/>
-          </a:xfrm>
-          <a:prstGeom prst="bentConnector3">
-            <a:avLst/>
-          </a:prstGeom>
-          <a:ln>
-            <a:solidFill>
-              <a:srgbClr val="000000"/>
-            </a:solidFill>
-            <a:tailEnd len="med" type="triangle" w="med"/>
-          </a:ln>
-        </p:spPr>
-      </p:cxnSp>
-      <p:sp>
-        <p:nvSpPr>
-          <p:cNvPr id="161" name="TextShape 28"/>
-          <p:cNvSpPr txBox="1"/>
-          <p:nvPr/>
-        </p:nvSpPr>
-        <p:spPr>
-          <a:xfrm>
-            <a:off x="2430000" y="643680"/>
-            <a:ext cx="1026000" cy="346680"/>
-          </a:xfrm>
-          <a:prstGeom prst="rect">
-            <a:avLst/>
-          </a:prstGeom>
-        </p:spPr>
-        <p:txBody>
-          <a:bodyPr bIns="45000" lIns="90000" rIns="90000" tIns="45000" wrap="none"/>
-          <a:p>
-            <a:r>
-              <a:rPr lang="en-GB" sz="900"/>
-              <a:t>REFRESH, UPDATE</a:t>
-            </a:r>
-            <a:endParaRPr/>
-          </a:p>
-        </p:txBody>
-      </p:sp>
-      <p:sp>
-        <p:nvSpPr>
-          <p:cNvPr id="162" name="TextShape 29"/>
-          <p:cNvSpPr txBox="1"/>
-          <p:nvPr/>
-        </p:nvSpPr>
-        <p:spPr>
-          <a:xfrm>
-            <a:off x="1944000" y="3312360"/>
-            <a:ext cx="1026000" cy="218520"/>
-          </a:xfrm>
-          <a:prstGeom prst="rect">
-            <a:avLst/>
-          </a:prstGeom>
-        </p:spPr>
-        <p:txBody>
-          <a:bodyPr bIns="45000" lIns="90000" rIns="90000" tIns="45000" wrap="none"/>
-          <a:p>
-            <a:r>
-              <a:rPr lang="en-GB" sz="900"/>
-              <a:t>UNINSTALL</a:t>
-            </a:r>
-            <a:endParaRPr/>
-          </a:p>
-        </p:txBody>
-      </p:sp>
-      <p:sp>
-        <p:nvSpPr>
-          <p:cNvPr id="163" name="TextShape 30"/>
-          <p:cNvSpPr txBox="1"/>
-          <p:nvPr/>
-        </p:nvSpPr>
-        <p:spPr>
-          <a:xfrm>
-            <a:off x="3870000" y="1932840"/>
-            <a:ext cx="1026000" cy="218520"/>
-          </a:xfrm>
-          <a:prstGeom prst="rect">
-            <a:avLst/>
-          </a:prstGeom>
-        </p:spPr>
-        <p:txBody>
-          <a:bodyPr bIns="45000" lIns="90000" rIns="90000" tIns="45000" wrap="none"/>
-          <a:p>
-            <a:r>
-              <a:rPr lang="en-GB" sz="900"/>
-              <a:t>START</a:t>
-            </a:r>
-            <a:endParaRPr/>
-          </a:p>
-        </p:txBody>
-      </p:sp>
-      <p:sp>
-        <p:nvSpPr>
-          <p:cNvPr id="164" name="TextShape 31"/>
-          <p:cNvSpPr txBox="1"/>
-          <p:nvPr/>
-        </p:nvSpPr>
-        <p:spPr>
-          <a:xfrm>
-            <a:off x="7110000" y="3240360"/>
-            <a:ext cx="1026000" cy="218520"/>
-          </a:xfrm>
-          <a:prstGeom prst="rect">
-            <a:avLst/>
-          </a:prstGeom>
-        </p:spPr>
-        <p:txBody>
-          <a:bodyPr bIns="45000" lIns="90000" rIns="90000" tIns="45000" wrap="none"/>
-          <a:p>
-            <a:r>
-              <a:rPr lang="en-GB" sz="900"/>
-              <a:t>STOP</a:t>
-            </a:r>
-            <a:endParaRPr/>
-          </a:p>
-        </p:txBody>
-      </p:sp>
+        </p:nvPicPr>
+        <p:blipFill>
+          <a:blip r:embed="rId1"/>
+          <a:stretch>
+            <a:fillRect/>
+          </a:stretch>
+        </p:blipFill>
+        <p:spPr>
+          <a:xfrm>
+            <a:off x="792000" y="386280"/>
+            <a:ext cx="7560000" cy="5013720"/>
+          </a:xfrm>
+          <a:prstGeom prst="rect">
+            <a:avLst/>
+          </a:prstGeom>
+        </p:spPr>
+      </p:pic>
     </p:spTree>
   </p:cSld>
   <p:timing>

</xml_diff>